<commit_message>
minor alignment changes and grammer changes
</commit_message>
<xml_diff>
--- a/Assets/Senior Project Documents/Poster Templates/Chosen One V2.pptx
+++ b/Assets/Senior Project Documents/Poster Templates/Chosen One V2.pptx
@@ -109,7 +109,7 @@
   </p:defaultTextStyle>
   <p:extLst>
     <p:ext uri="{EFAFB233-063F-42B5-8137-9DF3F51BA10A}">
-      <p15:sldGuideLst xmlns="" xmlns:p15="http://schemas.microsoft.com/office/powerpoint/2012/main">
+      <p15:sldGuideLst xmlns:p15="http://schemas.microsoft.com/office/powerpoint/2012/main" xmlns="">
         <p15:guide id="1" orient="horz" pos="3035">
           <p15:clr>
             <a:srgbClr val="A4A3A4"/>
@@ -899,7 +899,7 @@
           <p:nvPr/>
         </p:nvPicPr>
         <mc:AlternateContent xmlns:mc="http://schemas.openxmlformats.org/markup-compatibility/2006">
-          <mc:Choice xmlns:ma="http://schemas.microsoft.com/office/mac/drawingml/2008/main" xmlns:mv="urn:schemas-microsoft-com:mac:vml" xmlns="" Requires="ma">
+          <mc:Choice xmlns="" xmlns:mv="urn:schemas-microsoft-com:mac:vml" xmlns:ma="http://schemas.microsoft.com/office/mac/drawingml/2008/main" Requires="ma">
             <p:blipFill>
               <a:blip r:embed="rId4"/>
               <a:stretch>
@@ -1300,15 +1300,6 @@
               </a:rPr>
               <a:t>, Feature [23]</a:t>
             </a:r>
-            <a:endParaRPr lang="en-US" sz="4000" b="0" i="1" baseline="0" dirty="0" smtClean="0">
-              <a:solidFill>
-                <a:schemeClr val="accent3">
-                  <a:lumMod val="50000"/>
-                </a:schemeClr>
-              </a:solidFill>
-              <a:latin typeface="Times New Roman" pitchFamily="18" charset="0"/>
-              <a:cs typeface="Times New Roman" pitchFamily="18" charset="0"/>
-            </a:endParaRPr>
           </a:p>
           <a:p>
             <a:pPr algn="ctr"/>
@@ -1370,8 +1361,11 @@
                 <a:latin typeface="Times New Roman" pitchFamily="18" charset="0"/>
                 <a:cs typeface="Times New Roman" pitchFamily="18" charset="0"/>
               </a:rPr>
-              <a:t> Folds, Julio Orozco and John </a:t>
-            </a:r>
+              <a:t> Folds, Julio Orozco and John Verdi</a:t>
+            </a:r>
+          </a:p>
+          <a:p>
+            <a:pPr algn="ctr"/>
             <a:r>
               <a:rPr lang="en-US" sz="4000" b="0" i="1" baseline="0" dirty="0" smtClean="0">
                 <a:solidFill>
@@ -1382,32 +1376,8 @@
                 <a:latin typeface="Times New Roman" pitchFamily="18" charset="0"/>
                 <a:cs typeface="Times New Roman" pitchFamily="18" charset="0"/>
               </a:rPr>
-              <a:t>Verdi</a:t>
-            </a:r>
-          </a:p>
-          <a:p>
-            <a:pPr algn="ctr"/>
-            <a:r>
-              <a:rPr lang="en-US" sz="4000" b="0" i="1" baseline="0" dirty="0" smtClean="0">
-                <a:solidFill>
-                  <a:schemeClr val="accent3">
-                    <a:lumMod val="50000"/>
-                  </a:schemeClr>
-                </a:solidFill>
-                <a:latin typeface="Times New Roman" pitchFamily="18" charset="0"/>
-                <a:cs typeface="Times New Roman" pitchFamily="18" charset="0"/>
-              </a:rPr>
               <a:t>Mentors (Feature [23]): Nick Campanini, Mike Potts</a:t>
             </a:r>
-            <a:endParaRPr lang="en-US" sz="4000" b="0" i="1" baseline="0" dirty="0" smtClean="0">
-              <a:solidFill>
-                <a:schemeClr val="accent3">
-                  <a:lumMod val="50000"/>
-                </a:schemeClr>
-              </a:solidFill>
-              <a:latin typeface="Times New Roman" pitchFamily="18" charset="0"/>
-              <a:cs typeface="Times New Roman" pitchFamily="18" charset="0"/>
-            </a:endParaRPr>
           </a:p>
           <a:p>
             <a:pPr algn="ctr"/>
@@ -2740,8 +2710,8 @@
         </p:nvSpPr>
         <p:spPr>
           <a:xfrm>
-            <a:off x="514390" y="26479500"/>
-            <a:ext cx="10210799" cy="3785652"/>
+            <a:off x="514391" y="26479500"/>
+            <a:ext cx="10182226" cy="3785652"/>
           </a:xfrm>
           <a:prstGeom prst="rect">
             <a:avLst/>
@@ -2759,7 +2729,49 @@
                 <a:latin typeface="Times New Roman" panose="02020603050405020304" pitchFamily="18" charset="0"/>
                 <a:cs typeface="Times New Roman" panose="02020603050405020304" pitchFamily="18" charset="0"/>
               </a:rPr>
-              <a:t>In our e-Voting System we have accumulated roughly  40 different user stories so far. All of these user stories revolves around 3 actors; Voter, Admin, Mobile Voter.  Below is a snippet of just a couple of the user stories we came up with.</a:t>
+              <a:t>In our e-Voting System we have accumulated roughly  40 different user stories so far. All of these user stories </a:t>
+            </a:r>
+            <a:r>
+              <a:rPr lang="en-US" sz="4000" dirty="0" smtClean="0">
+                <a:latin typeface="Times New Roman" panose="02020603050405020304" pitchFamily="18" charset="0"/>
+                <a:cs typeface="Times New Roman" panose="02020603050405020304" pitchFamily="18" charset="0"/>
+              </a:rPr>
+              <a:t>revolve </a:t>
+            </a:r>
+            <a:r>
+              <a:rPr lang="en-US" sz="4000" dirty="0" smtClean="0">
+                <a:latin typeface="Times New Roman" panose="02020603050405020304" pitchFamily="18" charset="0"/>
+                <a:cs typeface="Times New Roman" panose="02020603050405020304" pitchFamily="18" charset="0"/>
+              </a:rPr>
+              <a:t>around 3 actors; Voter, Admin, </a:t>
+            </a:r>
+            <a:r>
+              <a:rPr lang="en-US" sz="4000" dirty="0" smtClean="0">
+                <a:latin typeface="Times New Roman" panose="02020603050405020304" pitchFamily="18" charset="0"/>
+                <a:cs typeface="Times New Roman" panose="02020603050405020304" pitchFamily="18" charset="0"/>
+              </a:rPr>
+              <a:t>and Mobile </a:t>
+            </a:r>
+            <a:r>
+              <a:rPr lang="en-US" sz="4000" dirty="0" smtClean="0">
+                <a:latin typeface="Times New Roman" panose="02020603050405020304" pitchFamily="18" charset="0"/>
+                <a:cs typeface="Times New Roman" panose="02020603050405020304" pitchFamily="18" charset="0"/>
+              </a:rPr>
+              <a:t>Voter.  </a:t>
+            </a:r>
+            <a:r>
+              <a:rPr lang="en-US" sz="4000" dirty="0" smtClean="0">
+                <a:latin typeface="Times New Roman" panose="02020603050405020304" pitchFamily="18" charset="0"/>
+                <a:cs typeface="Times New Roman" panose="02020603050405020304" pitchFamily="18" charset="0"/>
+              </a:rPr>
+              <a:t>Above is </a:t>
+            </a:r>
+            <a:r>
+              <a:rPr lang="en-US" sz="4000" dirty="0" smtClean="0">
+                <a:latin typeface="Times New Roman" panose="02020603050405020304" pitchFamily="18" charset="0"/>
+                <a:cs typeface="Times New Roman" panose="02020603050405020304" pitchFamily="18" charset="0"/>
+              </a:rPr>
+              <a:t>a snippet of just a couple of the user stories we came up with.</a:t>
             </a:r>
             <a:endParaRPr lang="en-US" sz="4000" dirty="0">
               <a:latin typeface="Times New Roman" panose="02020603050405020304" pitchFamily="18" charset="0"/>
@@ -2776,8 +2788,8 @@
         </p:nvSpPr>
         <p:spPr>
           <a:xfrm>
-            <a:off x="33181961" y="12217615"/>
-            <a:ext cx="10201274" cy="3785652"/>
+            <a:off x="33181958" y="12217615"/>
+            <a:ext cx="10201277" cy="3785652"/>
           </a:xfrm>
           <a:prstGeom prst="rect">
             <a:avLst/>
@@ -2986,8 +2998,8 @@
         </p:nvSpPr>
         <p:spPr>
           <a:xfrm>
-            <a:off x="11249066" y="6057900"/>
-            <a:ext cx="10210799" cy="1938992"/>
+            <a:off x="11401466" y="5868595"/>
+            <a:ext cx="9629733" cy="2554545"/>
           </a:xfrm>
           <a:prstGeom prst="rect">
             <a:avLst/>
@@ -3033,7 +3045,7 @@
         <p:spPr>
           <a:xfrm>
             <a:off x="11401466" y="8420100"/>
-            <a:ext cx="10210799" cy="3170099"/>
+            <a:ext cx="9629733" cy="3170099"/>
           </a:xfrm>
           <a:prstGeom prst="rect">
             <a:avLst/>
@@ -3078,8 +3090,8 @@
         </p:nvSpPr>
         <p:spPr>
           <a:xfrm>
-            <a:off x="11401466" y="18697881"/>
-            <a:ext cx="10210799" cy="3785652"/>
+            <a:off x="11401466" y="18553214"/>
+            <a:ext cx="9629733" cy="4401205"/>
           </a:xfrm>
           <a:prstGeom prst="rect">
             <a:avLst/>
@@ -3124,8 +3136,8 @@
         </p:nvSpPr>
         <p:spPr>
           <a:xfrm>
-            <a:off x="22250401" y="6057900"/>
-            <a:ext cx="10325140" cy="3170099"/>
+            <a:off x="22250400" y="6057900"/>
+            <a:ext cx="10420389" cy="3170099"/>
           </a:xfrm>
           <a:prstGeom prst="rect">
             <a:avLst/>
@@ -3298,8 +3310,8 @@
         </p:nvSpPr>
         <p:spPr>
           <a:xfrm>
-            <a:off x="22051222" y="13189967"/>
-            <a:ext cx="10325138" cy="3170099"/>
+            <a:off x="22051221" y="13189967"/>
+            <a:ext cx="10619567" cy="3170099"/>
           </a:xfrm>
           <a:prstGeom prst="rect">
             <a:avLst/>

</xml_diff>

<commit_message>
this is the final version from me, I don't see anything that needs to be changed.
</commit_message>
<xml_diff>
--- a/Assets/Senior Project Documents/Poster Templates/Chosen One V2.pptx
+++ b/Assets/Senior Project Documents/Poster Templates/Chosen One V2.pptx
@@ -109,7 +109,7 @@
   </p:defaultTextStyle>
   <p:extLst>
     <p:ext uri="{EFAFB233-063F-42B5-8137-9DF3F51BA10A}">
-      <p15:sldGuideLst xmlns:p15="http://schemas.microsoft.com/office/powerpoint/2012/main" xmlns="">
+      <p15:sldGuideLst xmlns="" xmlns:p15="http://schemas.microsoft.com/office/powerpoint/2012/main">
         <p15:guide id="1" orient="horz" pos="3035">
           <p15:clr>
             <a:srgbClr val="A4A3A4"/>
@@ -899,7 +899,7 @@
           <p:nvPr/>
         </p:nvPicPr>
         <mc:AlternateContent xmlns:mc="http://schemas.openxmlformats.org/markup-compatibility/2006">
-          <mc:Choice xmlns="" xmlns:mv="urn:schemas-microsoft-com:mac:vml" xmlns:ma="http://schemas.microsoft.com/office/mac/drawingml/2008/main" Requires="ma">
+          <mc:Choice xmlns:ma="http://schemas.microsoft.com/office/mac/drawingml/2008/main" xmlns:mv="urn:schemas-microsoft-com:mac:vml" xmlns="" Requires="ma">
             <p:blipFill>
               <a:blip r:embed="rId4"/>
               <a:stretch>
@@ -1119,8 +1119,8 @@
         </p:nvSpPr>
         <p:spPr bwMode="auto">
           <a:xfrm>
-            <a:off x="11340360" y="1940784"/>
-            <a:ext cx="21421724" cy="3046988"/>
+            <a:off x="11325266" y="1795207"/>
+            <a:ext cx="21421724" cy="3108543"/>
           </a:xfrm>
           <a:prstGeom prst="rect">
             <a:avLst/>
@@ -1274,10 +1274,10 @@
                 <a:latin typeface="Times New Roman" pitchFamily="18" charset="0"/>
                 <a:cs typeface="Times New Roman" pitchFamily="18" charset="0"/>
               </a:rPr>
-              <a:t>Team: </a:t>
-            </a:r>
-            <a:r>
-              <a:rPr lang="en-US" sz="4000" b="0" i="1" baseline="0" dirty="0" err="1" smtClean="0">
+              <a:t>Team</a:t>
+            </a:r>
+            <a:r>
+              <a:rPr lang="en-US" sz="4000" b="0" i="1" baseline="0" dirty="0" smtClean="0">
                 <a:solidFill>
                   <a:schemeClr val="accent3">
                     <a:lumMod val="50000"/>
@@ -1286,10 +1286,10 @@
                 <a:latin typeface="Times New Roman" pitchFamily="18" charset="0"/>
                 <a:cs typeface="Times New Roman" pitchFamily="18" charset="0"/>
               </a:rPr>
-              <a:t>Codeachrome</a:t>
-            </a:r>
-            <a:r>
-              <a:rPr lang="en-US" sz="4000" b="0" i="1" baseline="0" dirty="0" smtClean="0">
+              <a:t>: </a:t>
+            </a:r>
+            <a:r>
+              <a:rPr lang="en-US" sz="4000" b="0" i="1" baseline="0" dirty="0" err="1" smtClean="0">
                 <a:solidFill>
                   <a:schemeClr val="accent3">
                     <a:lumMod val="50000"/>
@@ -1298,6 +1298,18 @@
                 <a:latin typeface="Times New Roman" pitchFamily="18" charset="0"/>
                 <a:cs typeface="Times New Roman" pitchFamily="18" charset="0"/>
               </a:rPr>
+              <a:t>Codeachrome</a:t>
+            </a:r>
+            <a:r>
+              <a:rPr lang="en-US" sz="4000" b="0" i="1" baseline="0" dirty="0" smtClean="0">
+                <a:solidFill>
+                  <a:schemeClr val="accent3">
+                    <a:lumMod val="50000"/>
+                  </a:schemeClr>
+                </a:solidFill>
+                <a:latin typeface="Times New Roman" pitchFamily="18" charset="0"/>
+                <a:cs typeface="Times New Roman" pitchFamily="18" charset="0"/>
+              </a:rPr>
               <a:t>, Feature [23]</a:t>
             </a:r>
           </a:p>
@@ -1376,13 +1388,25 @@
                 <a:latin typeface="Times New Roman" pitchFamily="18" charset="0"/>
                 <a:cs typeface="Times New Roman" pitchFamily="18" charset="0"/>
               </a:rPr>
-              <a:t>Mentors (Feature [23]): Nick Campanini, Mike Potts</a:t>
+              <a:t>Mentors (Feature [23]): Nick Campanini, Mike </a:t>
+            </a:r>
+            <a:r>
+              <a:rPr lang="en-US" sz="4000" b="0" i="1" baseline="0" dirty="0" smtClean="0">
+                <a:solidFill>
+                  <a:schemeClr val="accent3">
+                    <a:lumMod val="50000"/>
+                  </a:schemeClr>
+                </a:solidFill>
+                <a:latin typeface="Times New Roman" pitchFamily="18" charset="0"/>
+                <a:cs typeface="Times New Roman" pitchFamily="18" charset="0"/>
+              </a:rPr>
+              <a:t>Potts</a:t>
             </a:r>
           </a:p>
           <a:p>
             <a:pPr algn="ctr"/>
             <a:r>
-              <a:rPr lang="en-US" sz="3600" b="0" i="1" baseline="0" dirty="0" smtClean="0">
+              <a:rPr lang="en-US" sz="4000" b="0" i="1" baseline="0" dirty="0">
                 <a:solidFill>
                   <a:schemeClr val="accent3">
                     <a:lumMod val="50000"/>
@@ -1391,10 +1415,10 @@
                 <a:latin typeface="Times New Roman" pitchFamily="18" charset="0"/>
                 <a:cs typeface="Times New Roman" pitchFamily="18" charset="0"/>
               </a:rPr>
-              <a:t>University </a:t>
-            </a:r>
-            <a:r>
-              <a:rPr lang="en-US" sz="3600" b="0" i="1" baseline="0" dirty="0">
+              <a:t>Class: Senior Project </a:t>
+            </a:r>
+            <a:r>
+              <a:rPr lang="en-US" sz="4000" b="0" i="1" baseline="0" dirty="0" smtClean="0">
                 <a:solidFill>
                   <a:schemeClr val="accent3">
                     <a:lumMod val="50000"/>
@@ -1403,10 +1427,10 @@
                 <a:latin typeface="Times New Roman" pitchFamily="18" charset="0"/>
                 <a:cs typeface="Times New Roman" pitchFamily="18" charset="0"/>
               </a:rPr>
-              <a:t>of North Florida, College </a:t>
-            </a:r>
-            <a:br>
-              <a:rPr lang="en-US" sz="3600" b="0" i="1" baseline="0" dirty="0">
+              <a:t>I     Professor</a:t>
+            </a:r>
+            <a:r>
+              <a:rPr lang="en-US" sz="4000" b="0" i="1" baseline="0" dirty="0">
                 <a:solidFill>
                   <a:schemeClr val="accent3">
                     <a:lumMod val="50000"/>
@@ -1415,9 +1439,10 @@
                 <a:latin typeface="Times New Roman" pitchFamily="18" charset="0"/>
                 <a:cs typeface="Times New Roman" pitchFamily="18" charset="0"/>
               </a:rPr>
-            </a:br>
-            <a:r>
-              <a:rPr lang="en-US" sz="3600" b="0" i="1" baseline="0" dirty="0">
+              <a:t>: </a:t>
+            </a:r>
+            <a:r>
+              <a:rPr lang="en-US" sz="4000" b="0" i="1" baseline="0" dirty="0" err="1">
                 <a:solidFill>
                   <a:schemeClr val="accent3">
                     <a:lumMod val="50000"/>
@@ -1426,7 +1451,91 @@
                 <a:latin typeface="Times New Roman" pitchFamily="18" charset="0"/>
                 <a:cs typeface="Times New Roman" pitchFamily="18" charset="0"/>
               </a:rPr>
-              <a:t>Jacksonville, FL USA 32224</a:t>
+              <a:t>Karthikeyan</a:t>
+            </a:r>
+            <a:r>
+              <a:rPr lang="en-US" sz="4000" b="0" i="1" baseline="0" dirty="0">
+                <a:solidFill>
+                  <a:schemeClr val="accent3">
+                    <a:lumMod val="50000"/>
+                  </a:schemeClr>
+                </a:solidFill>
+                <a:latin typeface="Times New Roman" pitchFamily="18" charset="0"/>
+                <a:cs typeface="Times New Roman" pitchFamily="18" charset="0"/>
+              </a:rPr>
+              <a:t> </a:t>
+            </a:r>
+            <a:r>
+              <a:rPr lang="en-US" sz="4000" b="0" i="1" baseline="0" dirty="0" err="1" smtClean="0">
+                <a:solidFill>
+                  <a:schemeClr val="accent3">
+                    <a:lumMod val="50000"/>
+                  </a:schemeClr>
+                </a:solidFill>
+                <a:latin typeface="Times New Roman" pitchFamily="18" charset="0"/>
+                <a:cs typeface="Times New Roman" pitchFamily="18" charset="0"/>
+              </a:rPr>
+              <a:t>Umapathy</a:t>
+            </a:r>
+            <a:endParaRPr lang="en-US" sz="4000" b="0" i="1" baseline="0" dirty="0" smtClean="0">
+              <a:solidFill>
+                <a:schemeClr val="accent3">
+                  <a:lumMod val="50000"/>
+                </a:schemeClr>
+              </a:solidFill>
+              <a:latin typeface="Times New Roman" pitchFamily="18" charset="0"/>
+              <a:cs typeface="Times New Roman" pitchFamily="18" charset="0"/>
+            </a:endParaRPr>
+          </a:p>
+          <a:p>
+            <a:pPr algn="ctr"/>
+            <a:r>
+              <a:rPr lang="en-US" sz="3600" b="0" i="1" baseline="0" dirty="0" smtClean="0">
+                <a:solidFill>
+                  <a:schemeClr val="accent3">
+                    <a:lumMod val="50000"/>
+                  </a:schemeClr>
+                </a:solidFill>
+                <a:latin typeface="Times New Roman" pitchFamily="18" charset="0"/>
+                <a:cs typeface="Times New Roman" pitchFamily="18" charset="0"/>
+              </a:rPr>
+              <a:t>University </a:t>
+            </a:r>
+            <a:r>
+              <a:rPr lang="en-US" sz="3600" b="0" i="1" baseline="0" dirty="0">
+                <a:solidFill>
+                  <a:schemeClr val="accent3">
+                    <a:lumMod val="50000"/>
+                  </a:schemeClr>
+                </a:solidFill>
+                <a:latin typeface="Times New Roman" pitchFamily="18" charset="0"/>
+                <a:cs typeface="Times New Roman" pitchFamily="18" charset="0"/>
+              </a:rPr>
+              <a:t>of North Florida, </a:t>
+            </a:r>
+            <a:r>
+              <a:rPr lang="en-US" sz="3600" b="0" i="1" baseline="0" dirty="0" smtClean="0">
+                <a:solidFill>
+                  <a:schemeClr val="accent3">
+                    <a:lumMod val="50000"/>
+                  </a:schemeClr>
+                </a:solidFill>
+                <a:latin typeface="Times New Roman" pitchFamily="18" charset="0"/>
+                <a:cs typeface="Times New Roman" pitchFamily="18" charset="0"/>
+              </a:rPr>
+              <a:t>College, Jacksonville</a:t>
+            </a:r>
+            <a:r>
+              <a:rPr lang="en-US" sz="3600" b="0" i="1" baseline="0" dirty="0">
+                <a:solidFill>
+                  <a:schemeClr val="accent3">
+                    <a:lumMod val="50000"/>
+                  </a:schemeClr>
+                </a:solidFill>
+                <a:latin typeface="Times New Roman" pitchFamily="18" charset="0"/>
+                <a:cs typeface="Times New Roman" pitchFamily="18" charset="0"/>
+              </a:rPr>
+              <a:t>, FL USA 32224</a:t>
             </a:r>
           </a:p>
         </p:txBody>
@@ -2729,49 +2838,7 @@
                 <a:latin typeface="Times New Roman" panose="02020603050405020304" pitchFamily="18" charset="0"/>
                 <a:cs typeface="Times New Roman" panose="02020603050405020304" pitchFamily="18" charset="0"/>
               </a:rPr>
-              <a:t>In our e-Voting System we have accumulated roughly  40 different user stories so far. All of these user stories </a:t>
-            </a:r>
-            <a:r>
-              <a:rPr lang="en-US" sz="4000" dirty="0" smtClean="0">
-                <a:latin typeface="Times New Roman" panose="02020603050405020304" pitchFamily="18" charset="0"/>
-                <a:cs typeface="Times New Roman" panose="02020603050405020304" pitchFamily="18" charset="0"/>
-              </a:rPr>
-              <a:t>revolve </a:t>
-            </a:r>
-            <a:r>
-              <a:rPr lang="en-US" sz="4000" dirty="0" smtClean="0">
-                <a:latin typeface="Times New Roman" panose="02020603050405020304" pitchFamily="18" charset="0"/>
-                <a:cs typeface="Times New Roman" panose="02020603050405020304" pitchFamily="18" charset="0"/>
-              </a:rPr>
-              <a:t>around 3 actors; Voter, Admin, </a:t>
-            </a:r>
-            <a:r>
-              <a:rPr lang="en-US" sz="4000" dirty="0" smtClean="0">
-                <a:latin typeface="Times New Roman" panose="02020603050405020304" pitchFamily="18" charset="0"/>
-                <a:cs typeface="Times New Roman" panose="02020603050405020304" pitchFamily="18" charset="0"/>
-              </a:rPr>
-              <a:t>and Mobile </a:t>
-            </a:r>
-            <a:r>
-              <a:rPr lang="en-US" sz="4000" dirty="0" smtClean="0">
-                <a:latin typeface="Times New Roman" panose="02020603050405020304" pitchFamily="18" charset="0"/>
-                <a:cs typeface="Times New Roman" panose="02020603050405020304" pitchFamily="18" charset="0"/>
-              </a:rPr>
-              <a:t>Voter.  </a:t>
-            </a:r>
-            <a:r>
-              <a:rPr lang="en-US" sz="4000" dirty="0" smtClean="0">
-                <a:latin typeface="Times New Roman" panose="02020603050405020304" pitchFamily="18" charset="0"/>
-                <a:cs typeface="Times New Roman" panose="02020603050405020304" pitchFamily="18" charset="0"/>
-              </a:rPr>
-              <a:t>Above is </a:t>
-            </a:r>
-            <a:r>
-              <a:rPr lang="en-US" sz="4000" dirty="0" smtClean="0">
-                <a:latin typeface="Times New Roman" panose="02020603050405020304" pitchFamily="18" charset="0"/>
-                <a:cs typeface="Times New Roman" panose="02020603050405020304" pitchFamily="18" charset="0"/>
-              </a:rPr>
-              <a:t>a snippet of just a couple of the user stories we came up with.</a:t>
+              <a:t>In our e-Voting System we have accumulated roughly  40 different user stories so far. All of these user stories revolve around 3 actors; Voter, Admin, and Mobile Voter.  Above is a snippet of just a couple of the user stories we came up with.</a:t>
             </a:r>
             <a:endParaRPr lang="en-US" sz="4000" dirty="0">
               <a:latin typeface="Times New Roman" panose="02020603050405020304" pitchFamily="18" charset="0"/>
@@ -3073,7 +3140,21 @@
                 <a:latin typeface="Times New Roman" panose="02020603050405020304" pitchFamily="18" charset="0"/>
                 <a:cs typeface="Times New Roman" panose="02020603050405020304" pitchFamily="18" charset="0"/>
               </a:rPr>
-              <a:t> After attending the event and gathering relevant material regarding the event flow we have started development of a stand alone kiosk type voting platform as well as a mobile application.</a:t>
+              <a:t> After attending the event and gathering relevant </a:t>
+            </a:r>
+            <a:r>
+              <a:rPr lang="en-US" sz="4000" dirty="0" smtClean="0">
+                <a:latin typeface="Times New Roman" panose="02020603050405020304" pitchFamily="18" charset="0"/>
+                <a:cs typeface="Times New Roman" panose="02020603050405020304" pitchFamily="18" charset="0"/>
+              </a:rPr>
+              <a:t>materials </a:t>
+            </a:r>
+            <a:r>
+              <a:rPr lang="en-US" sz="4000" dirty="0" smtClean="0">
+                <a:latin typeface="Times New Roman" panose="02020603050405020304" pitchFamily="18" charset="0"/>
+                <a:cs typeface="Times New Roman" panose="02020603050405020304" pitchFamily="18" charset="0"/>
+              </a:rPr>
+              <a:t>regarding the event flow we have started development of a stand alone kiosk type voting platform as well as a mobile application.</a:t>
             </a:r>
             <a:endParaRPr lang="en-US" sz="4000" dirty="0">
               <a:latin typeface="Times New Roman" panose="02020603050405020304" pitchFamily="18" charset="0"/>
@@ -3119,7 +3200,21 @@
                 <a:latin typeface="Times New Roman" panose="02020603050405020304" pitchFamily="18" charset="0"/>
                 <a:cs typeface="Times New Roman" panose="02020603050405020304" pitchFamily="18" charset="0"/>
               </a:rPr>
-              <a:t> Our initial ERD defines all the entities and attributes that are relevant to the implementation of our e-Voting and Feedback system. Data collected from voters will be used to populate a Leader board and provide attendees and participants feedback on the top films.</a:t>
+              <a:t> Our initial ERD defines all the entities and attributes that are relevant to the implementation of our e-Voting and Feedback system. Data collected from voters will be used to populate a </a:t>
+            </a:r>
+            <a:r>
+              <a:rPr lang="en-US" sz="4000" dirty="0" smtClean="0">
+                <a:latin typeface="Times New Roman" panose="02020603050405020304" pitchFamily="18" charset="0"/>
+                <a:cs typeface="Times New Roman" panose="02020603050405020304" pitchFamily="18" charset="0"/>
+              </a:rPr>
+              <a:t>leader </a:t>
+            </a:r>
+            <a:r>
+              <a:rPr lang="en-US" sz="4000" dirty="0" smtClean="0">
+                <a:latin typeface="Times New Roman" panose="02020603050405020304" pitchFamily="18" charset="0"/>
+                <a:cs typeface="Times New Roman" panose="02020603050405020304" pitchFamily="18" charset="0"/>
+              </a:rPr>
+              <a:t>board and provide attendees and participants feedback on the top films.</a:t>
             </a:r>
             <a:endParaRPr lang="en-US" sz="4000" dirty="0">
               <a:latin typeface="Times New Roman" panose="02020603050405020304" pitchFamily="18" charset="0"/>
@@ -3339,7 +3434,21 @@
                 <a:latin typeface="Times New Roman" panose="02020603050405020304" pitchFamily="18" charset="0"/>
                 <a:cs typeface="Times New Roman" panose="02020603050405020304" pitchFamily="18" charset="0"/>
               </a:rPr>
-              <a:t> Each attendee will be given a voter ID card containing a unique QR Code that when scanned by our mobile or kiosk platforms collects some optional demographics information and directs them to the voting page.</a:t>
+              <a:t> Each attendee will be given a voter ID card containing a unique QR Code that when scanned by our mobile or kiosk platforms collects some optional </a:t>
+            </a:r>
+            <a:r>
+              <a:rPr lang="en-US" sz="4000" dirty="0" smtClean="0">
+                <a:latin typeface="Times New Roman" panose="02020603050405020304" pitchFamily="18" charset="0"/>
+                <a:cs typeface="Times New Roman" panose="02020603050405020304" pitchFamily="18" charset="0"/>
+              </a:rPr>
+              <a:t>demographic </a:t>
+            </a:r>
+            <a:r>
+              <a:rPr lang="en-US" sz="4000" dirty="0" smtClean="0">
+                <a:latin typeface="Times New Roman" panose="02020603050405020304" pitchFamily="18" charset="0"/>
+                <a:cs typeface="Times New Roman" panose="02020603050405020304" pitchFamily="18" charset="0"/>
+              </a:rPr>
+              <a:t>information and directs them to the voting page.</a:t>
             </a:r>
             <a:endParaRPr lang="en-US" sz="4000" dirty="0">
               <a:latin typeface="Times New Roman" panose="02020603050405020304" pitchFamily="18" charset="0"/>

</xml_diff>